<commit_message>
Modified UI component parent
</commit_message>
<xml_diff>
--- a/Docs/A1_Part2/Component Architecture.pptx
+++ b/Docs/A1_Part2/Component Architecture.pptx
@@ -13363,19 +13363,17 @@
       </p:sp>
       <p:pic>
         <p:nvPicPr>
-          <p:cNvPr id="8" name="내용 개체 틀 7" descr="지도이(가) 표시된 사진&#10;&#10;자동 생성된 설명">
+          <p:cNvPr id="4" name="그림 3" descr="지도이(가) 표시된 사진&#10;&#10;자동 생성된 설명">
             <a:extLst>
               <a:ext uri="{FF2B5EF4-FFF2-40B4-BE49-F238E27FC236}">
-                <a16:creationId xmlns:a16="http://schemas.microsoft.com/office/drawing/2014/main" id="{CD091999-B67B-4139-BE11-5CAA57EDBFA7}"/>
+                <a16:creationId xmlns:a16="http://schemas.microsoft.com/office/drawing/2014/main" id="{319189F4-9BE9-4F7F-93E7-5DFB9CEC3D56}"/>
               </a:ext>
             </a:extLst>
           </p:cNvPr>
           <p:cNvPicPr>
-            <a:picLocks noGrp="1" noChangeAspect="1"/>
+            <a:picLocks noChangeAspect="1"/>
           </p:cNvPicPr>
-          <p:nvPr>
-            <p:ph idx="1"/>
-          </p:nvPr>
+          <p:nvPr/>
         </p:nvPicPr>
         <p:blipFill>
           <a:blip r:embed="rId2">
@@ -13391,9 +13389,12 @@
         </p:blipFill>
         <p:spPr>
           <a:xfrm>
-            <a:off x="0" y="2382314"/>
-            <a:ext cx="11956259" cy="3713686"/>
+            <a:off x="0" y="2107701"/>
+            <a:ext cx="12192000" cy="4405513"/>
           </a:xfrm>
+          <a:prstGeom prst="rect">
+            <a:avLst/>
+          </a:prstGeom>
         </p:spPr>
       </p:pic>
       <p:sp>
@@ -13410,7 +13411,7 @@
         </p:nvSpPr>
         <p:spPr>
           <a:xfrm>
-            <a:off x="847546" y="6096000"/>
+            <a:off x="847546" y="6302044"/>
             <a:ext cx="9376228" cy="369332"/>
           </a:xfrm>
           <a:prstGeom prst="rect">

</xml_diff>